<commit_message>
Created a mini architecture for DB.
</commit_message>
<xml_diff>
--- a/Documents/nishant_research/Presentations/GroupProjectDeploymentInfrastructure.pptx
+++ b/Documents/nishant_research/Presentations/GroupProjectDeploymentInfrastructure.pptx
@@ -6,7 +6,8 @@
   </p:sldMasterIdLst>
   <p:sldIdLst>
     <p:sldId id="256" r:id="rId2"/>
-    <p:sldId id="257" r:id="rId3"/>
+    <p:sldId id="258" r:id="rId3"/>
+    <p:sldId id="257" r:id="rId4"/>
   </p:sldIdLst>
   <p:sldSz cx="12192000" cy="6858000"/>
   <p:notesSz cx="6858000" cy="9144000"/>
@@ -105,6 +106,11 @@
       </a:defRPr>
     </a:lvl9pPr>
   </p:defaultTextStyle>
+  <p:extLst>
+    <p:ext uri="{EFAFB233-063F-42B5-8137-9DF3F51BA10A}">
+      <p15:sldGuideLst xmlns:p15="http://schemas.microsoft.com/office/powerpoint/2012/main"/>
+    </p:ext>
+  </p:extLst>
 </p:presentation>
 </file>
 
@@ -255,7 +261,7 @@
           <a:p>
             <a:fld id="{FF6F8B42-3DD2-4560-A2EF-DD548B52E6A7}" type="datetimeFigureOut">
               <a:rPr lang="en-US" smtClean="0"/>
-              <a:t>9/27/2023</a:t>
+              <a:t>10/19/2023</a:t>
             </a:fld>
             <a:endParaRPr lang="en-US"/>
           </a:p>
@@ -453,7 +459,7 @@
           <a:p>
             <a:fld id="{FF6F8B42-3DD2-4560-A2EF-DD548B52E6A7}" type="datetimeFigureOut">
               <a:rPr lang="en-US" smtClean="0"/>
-              <a:t>9/27/2023</a:t>
+              <a:t>10/19/2023</a:t>
             </a:fld>
             <a:endParaRPr lang="en-US"/>
           </a:p>
@@ -661,7 +667,7 @@
           <a:p>
             <a:fld id="{FF6F8B42-3DD2-4560-A2EF-DD548B52E6A7}" type="datetimeFigureOut">
               <a:rPr lang="en-US" smtClean="0"/>
-              <a:t>9/27/2023</a:t>
+              <a:t>10/19/2023</a:t>
             </a:fld>
             <a:endParaRPr lang="en-US"/>
           </a:p>
@@ -859,7 +865,7 @@
           <a:p>
             <a:fld id="{FF6F8B42-3DD2-4560-A2EF-DD548B52E6A7}" type="datetimeFigureOut">
               <a:rPr lang="en-US" smtClean="0"/>
-              <a:t>9/27/2023</a:t>
+              <a:t>10/19/2023</a:t>
             </a:fld>
             <a:endParaRPr lang="en-US"/>
           </a:p>
@@ -1134,7 +1140,7 @@
           <a:p>
             <a:fld id="{FF6F8B42-3DD2-4560-A2EF-DD548B52E6A7}" type="datetimeFigureOut">
               <a:rPr lang="en-US" smtClean="0"/>
-              <a:t>9/27/2023</a:t>
+              <a:t>10/19/2023</a:t>
             </a:fld>
             <a:endParaRPr lang="en-US"/>
           </a:p>
@@ -1399,7 +1405,7 @@
           <a:p>
             <a:fld id="{FF6F8B42-3DD2-4560-A2EF-DD548B52E6A7}" type="datetimeFigureOut">
               <a:rPr lang="en-US" smtClean="0"/>
-              <a:t>9/27/2023</a:t>
+              <a:t>10/19/2023</a:t>
             </a:fld>
             <a:endParaRPr lang="en-US"/>
           </a:p>
@@ -1811,7 +1817,7 @@
           <a:p>
             <a:fld id="{FF6F8B42-3DD2-4560-A2EF-DD548B52E6A7}" type="datetimeFigureOut">
               <a:rPr lang="en-US" smtClean="0"/>
-              <a:t>9/27/2023</a:t>
+              <a:t>10/19/2023</a:t>
             </a:fld>
             <a:endParaRPr lang="en-US"/>
           </a:p>
@@ -1952,7 +1958,7 @@
           <a:p>
             <a:fld id="{FF6F8B42-3DD2-4560-A2EF-DD548B52E6A7}" type="datetimeFigureOut">
               <a:rPr lang="en-US" smtClean="0"/>
-              <a:t>9/27/2023</a:t>
+              <a:t>10/19/2023</a:t>
             </a:fld>
             <a:endParaRPr lang="en-US"/>
           </a:p>
@@ -2065,7 +2071,7 @@
           <a:p>
             <a:fld id="{FF6F8B42-3DD2-4560-A2EF-DD548B52E6A7}" type="datetimeFigureOut">
               <a:rPr lang="en-US" smtClean="0"/>
-              <a:t>9/27/2023</a:t>
+              <a:t>10/19/2023</a:t>
             </a:fld>
             <a:endParaRPr lang="en-US"/>
           </a:p>
@@ -2376,7 +2382,7 @@
           <a:p>
             <a:fld id="{FF6F8B42-3DD2-4560-A2EF-DD548B52E6A7}" type="datetimeFigureOut">
               <a:rPr lang="en-US" smtClean="0"/>
-              <a:t>9/27/2023</a:t>
+              <a:t>10/19/2023</a:t>
             </a:fld>
             <a:endParaRPr lang="en-US"/>
           </a:p>
@@ -2664,7 +2670,7 @@
           <a:p>
             <a:fld id="{FF6F8B42-3DD2-4560-A2EF-DD548B52E6A7}" type="datetimeFigureOut">
               <a:rPr lang="en-US" smtClean="0"/>
-              <a:t>9/27/2023</a:t>
+              <a:t>10/19/2023</a:t>
             </a:fld>
             <a:endParaRPr lang="en-US"/>
           </a:p>
@@ -2905,7 +2911,7 @@
           <a:p>
             <a:fld id="{FF6F8B42-3DD2-4560-A2EF-DD548B52E6A7}" type="datetimeFigureOut">
               <a:rPr lang="en-US" smtClean="0"/>
-              <a:t>9/27/2023</a:t>
+              <a:t>10/19/2023</a:t>
             </a:fld>
             <a:endParaRPr lang="en-US"/>
           </a:p>
@@ -5955,6 +5961,1805 @@
     </p:spTree>
     <p:extLst>
       <p:ext uri="{BB962C8B-B14F-4D97-AF65-F5344CB8AC3E}">
+        <p14:creationId xmlns:p14="http://schemas.microsoft.com/office/powerpoint/2010/main" val="470342590"/>
+      </p:ext>
+    </p:extLst>
+  </p:cSld>
+  <p:clrMapOvr>
+    <a:masterClrMapping/>
+  </p:clrMapOvr>
+</p:sld>
+</file>
+
+<file path=ppt/slides/slide3.xml><?xml version="1.0" encoding="utf-8"?>
+<p:sld xmlns:a="http://schemas.openxmlformats.org/drawingml/2006/main" xmlns:r="http://schemas.openxmlformats.org/officeDocument/2006/relationships" xmlns:p="http://schemas.openxmlformats.org/presentationml/2006/main">
+  <p:cSld>
+    <p:spTree>
+      <p:nvGrpSpPr>
+        <p:cNvPr id="1" name=""/>
+        <p:cNvGrpSpPr/>
+        <p:nvPr/>
+      </p:nvGrpSpPr>
+      <p:grpSpPr>
+        <a:xfrm>
+          <a:off x="0" y="0"/>
+          <a:ext cx="0" cy="0"/>
+          <a:chOff x="0" y="0"/>
+          <a:chExt cx="0" cy="0"/>
+        </a:xfrm>
+      </p:grpSpPr>
+      <p:sp>
+        <p:nvSpPr>
+          <p:cNvPr id="4" name="Rectangle 3">
+            <a:extLst>
+              <a:ext uri="{FF2B5EF4-FFF2-40B4-BE49-F238E27FC236}">
+                <a16:creationId xmlns:a16="http://schemas.microsoft.com/office/drawing/2014/main" id="{743A07C1-663B-36EE-4E3B-6C5A73244315}"/>
+              </a:ext>
+            </a:extLst>
+          </p:cNvPr>
+          <p:cNvSpPr/>
+          <p:nvPr/>
+        </p:nvSpPr>
+        <p:spPr>
+          <a:xfrm>
+            <a:off x="1700981" y="216506"/>
+            <a:ext cx="10009497" cy="6641493"/>
+          </a:xfrm>
+          <a:prstGeom prst="rect">
+            <a:avLst/>
+          </a:prstGeom>
+          <a:noFill/>
+          <a:ln w="15875">
+            <a:solidFill>
+              <a:schemeClr val="tx1"/>
+            </a:solidFill>
+          </a:ln>
+        </p:spPr>
+        <p:style>
+          <a:lnRef idx="2">
+            <a:schemeClr val="accent1">
+              <a:shade val="50000"/>
+            </a:schemeClr>
+          </a:lnRef>
+          <a:fillRef idx="1">
+            <a:schemeClr val="accent1"/>
+          </a:fillRef>
+          <a:effectRef idx="0">
+            <a:schemeClr val="accent1"/>
+          </a:effectRef>
+          <a:fontRef idx="minor">
+            <a:schemeClr val="lt1"/>
+          </a:fontRef>
+        </p:style>
+        <p:txBody>
+          <a:bodyPr lIns="502920" tIns="91440"/>
+          <a:lstStyle/>
+          <a:p>
+            <a:pPr eaLnBrk="1" fontAlgn="auto" hangingPunct="1">
+              <a:spcBef>
+                <a:spcPts val="0"/>
+              </a:spcBef>
+              <a:spcAft>
+                <a:spcPts val="0"/>
+              </a:spcAft>
+              <a:defRPr/>
+            </a:pPr>
+            <a:r>
+              <a:rPr lang="en-US" sz="1200" dirty="0">
+                <a:solidFill>
+                  <a:schemeClr val="tx1"/>
+                </a:solidFill>
+                <a:latin typeface="Arial" panose="020B0604020202020204" pitchFamily="34" charset="0"/>
+                <a:cs typeface="Arial" panose="020B0604020202020204" pitchFamily="34" charset="0"/>
+              </a:rPr>
+              <a:t>AWS Cloud</a:t>
+            </a:r>
+          </a:p>
+        </p:txBody>
+      </p:sp>
+      <p:pic>
+        <p:nvPicPr>
+          <p:cNvPr id="5" name="Graphic 4">
+            <a:extLst>
+              <a:ext uri="{FF2B5EF4-FFF2-40B4-BE49-F238E27FC236}">
+                <a16:creationId xmlns:a16="http://schemas.microsoft.com/office/drawing/2014/main" id="{89866020-0318-0A3C-F9C6-7D8B2AADBA50}"/>
+              </a:ext>
+            </a:extLst>
+          </p:cNvPr>
+          <p:cNvPicPr>
+            <a:picLocks noChangeAspect="1"/>
+          </p:cNvPicPr>
+          <p:nvPr/>
+        </p:nvPicPr>
+        <p:blipFill>
+          <a:blip r:embed="rId2">
+            <a:extLst>
+              <a:ext uri="{96DAC541-7B7A-43D3-8B79-37D633B846F1}">
+                <asvg:svgBlip xmlns:asvg="http://schemas.microsoft.com/office/drawing/2016/SVG/main" r:embed="rId3"/>
+              </a:ext>
+            </a:extLst>
+          </a:blip>
+          <a:srcRect/>
+          <a:stretch/>
+        </p:blipFill>
+        <p:spPr>
+          <a:xfrm>
+            <a:off x="2224315" y="216507"/>
+            <a:ext cx="381000" cy="381000"/>
+          </a:xfrm>
+          <a:prstGeom prst="rect">
+            <a:avLst/>
+          </a:prstGeom>
+        </p:spPr>
+      </p:pic>
+      <p:pic>
+        <p:nvPicPr>
+          <p:cNvPr id="26" name="Graphic 17">
+            <a:extLst>
+              <a:ext uri="{FF2B5EF4-FFF2-40B4-BE49-F238E27FC236}">
+                <a16:creationId xmlns:a16="http://schemas.microsoft.com/office/drawing/2014/main" id="{0B4105B4-4C01-8491-DCB8-4757427D9F78}"/>
+              </a:ext>
+            </a:extLst>
+          </p:cNvPr>
+          <p:cNvPicPr>
+            <a:picLocks noChangeAspect="1" noChangeArrowheads="1"/>
+          </p:cNvPicPr>
+          <p:nvPr/>
+        </p:nvPicPr>
+        <p:blipFill>
+          <a:blip r:embed="rId4">
+            <a:extLst>
+              <a:ext uri="{96DAC541-7B7A-43D3-8B79-37D633B846F1}">
+                <asvg:svgBlip xmlns:asvg="http://schemas.microsoft.com/office/drawing/2016/SVG/main" r:embed="rId5"/>
+              </a:ext>
+            </a:extLst>
+          </a:blip>
+          <a:srcRect/>
+          <a:stretch/>
+        </p:blipFill>
+        <p:spPr bwMode="auto">
+          <a:xfrm>
+            <a:off x="2541161" y="986212"/>
+            <a:ext cx="413567" cy="413567"/>
+          </a:xfrm>
+          <a:prstGeom prst="rect">
+            <a:avLst/>
+          </a:prstGeom>
+          <a:noFill/>
+          <a:ln>
+            <a:noFill/>
+          </a:ln>
+          <a:extLst>
+            <a:ext uri="{909E8E84-426E-40DD-AFC4-6F175D3DCCD1}">
+              <a14:hiddenFill xmlns:a14="http://schemas.microsoft.com/office/drawing/2010/main">
+                <a:solidFill>
+                  <a:srgbClr val="FFFFFF"/>
+                </a:solidFill>
+              </a14:hiddenFill>
+            </a:ext>
+            <a:ext uri="{91240B29-F687-4F45-9708-019B960494DF}">
+              <a14:hiddenLine xmlns:a14="http://schemas.microsoft.com/office/drawing/2010/main" w="9525">
+                <a:solidFill>
+                  <a:srgbClr val="000000"/>
+                </a:solidFill>
+                <a:miter lim="800000"/>
+                <a:headEnd/>
+                <a:tailEnd/>
+              </a14:hiddenLine>
+            </a:ext>
+          </a:extLst>
+        </p:spPr>
+      </p:pic>
+      <p:sp>
+        <p:nvSpPr>
+          <p:cNvPr id="27" name="TextBox 9">
+            <a:extLst>
+              <a:ext uri="{FF2B5EF4-FFF2-40B4-BE49-F238E27FC236}">
+                <a16:creationId xmlns:a16="http://schemas.microsoft.com/office/drawing/2014/main" id="{0D8C1CFF-66A4-ED0C-E826-32501C8CF8B8}"/>
+              </a:ext>
+            </a:extLst>
+          </p:cNvPr>
+          <p:cNvSpPr txBox="1">
+            <a:spLocks noChangeArrowheads="1"/>
+          </p:cNvSpPr>
+          <p:nvPr/>
+        </p:nvSpPr>
+        <p:spPr bwMode="auto">
+          <a:xfrm>
+            <a:off x="2232650" y="1396252"/>
+            <a:ext cx="1151339" cy="646331"/>
+          </a:xfrm>
+          <a:prstGeom prst="rect">
+            <a:avLst/>
+          </a:prstGeom>
+          <a:noFill/>
+          <a:ln>
+            <a:noFill/>
+          </a:ln>
+          <a:extLst>
+            <a:ext uri="{909E8E84-426E-40DD-AFC4-6F175D3DCCD1}">
+              <a14:hiddenFill xmlns:a14="http://schemas.microsoft.com/office/drawing/2010/main">
+                <a:solidFill>
+                  <a:srgbClr val="FFFFFF"/>
+                </a:solidFill>
+              </a14:hiddenFill>
+            </a:ext>
+            <a:ext uri="{91240B29-F687-4F45-9708-019B960494DF}">
+              <a14:hiddenLine xmlns:a14="http://schemas.microsoft.com/office/drawing/2010/main" w="9525">
+                <a:solidFill>
+                  <a:srgbClr val="000000"/>
+                </a:solidFill>
+                <a:miter lim="800000"/>
+                <a:headEnd/>
+                <a:tailEnd/>
+              </a14:hiddenLine>
+            </a:ext>
+          </a:extLst>
+        </p:spPr>
+        <p:txBody>
+          <a:bodyPr wrap="square">
+            <a:spAutoFit/>
+          </a:bodyPr>
+          <a:lstStyle>
+            <a:lvl1pPr>
+              <a:defRPr>
+                <a:solidFill>
+                  <a:schemeClr val="tx1"/>
+                </a:solidFill>
+                <a:latin typeface="Calibri" panose="020F0502020204030204" pitchFamily="34" charset="0"/>
+              </a:defRPr>
+            </a:lvl1pPr>
+            <a:lvl2pPr marL="742950" indent="-285750">
+              <a:defRPr>
+                <a:solidFill>
+                  <a:schemeClr val="tx1"/>
+                </a:solidFill>
+                <a:latin typeface="Calibri" panose="020F0502020204030204" pitchFamily="34" charset="0"/>
+              </a:defRPr>
+            </a:lvl2pPr>
+            <a:lvl3pPr marL="1143000" indent="-228600">
+              <a:defRPr>
+                <a:solidFill>
+                  <a:schemeClr val="tx1"/>
+                </a:solidFill>
+                <a:latin typeface="Calibri" panose="020F0502020204030204" pitchFamily="34" charset="0"/>
+              </a:defRPr>
+            </a:lvl3pPr>
+            <a:lvl4pPr marL="1600200" indent="-228600">
+              <a:defRPr>
+                <a:solidFill>
+                  <a:schemeClr val="tx1"/>
+                </a:solidFill>
+                <a:latin typeface="Calibri" panose="020F0502020204030204" pitchFamily="34" charset="0"/>
+              </a:defRPr>
+            </a:lvl4pPr>
+            <a:lvl5pPr marL="2057400" indent="-228600">
+              <a:defRPr>
+                <a:solidFill>
+                  <a:schemeClr val="tx1"/>
+                </a:solidFill>
+                <a:latin typeface="Calibri" panose="020F0502020204030204" pitchFamily="34" charset="0"/>
+              </a:defRPr>
+            </a:lvl5pPr>
+            <a:lvl6pPr marL="2514600" indent="-228600" eaLnBrk="0" fontAlgn="base" hangingPunct="0">
+              <a:spcBef>
+                <a:spcPct val="0"/>
+              </a:spcBef>
+              <a:spcAft>
+                <a:spcPct val="0"/>
+              </a:spcAft>
+              <a:defRPr>
+                <a:solidFill>
+                  <a:schemeClr val="tx1"/>
+                </a:solidFill>
+                <a:latin typeface="Calibri" panose="020F0502020204030204" pitchFamily="34" charset="0"/>
+              </a:defRPr>
+            </a:lvl6pPr>
+            <a:lvl7pPr marL="2971800" indent="-228600" eaLnBrk="0" fontAlgn="base" hangingPunct="0">
+              <a:spcBef>
+                <a:spcPct val="0"/>
+              </a:spcBef>
+              <a:spcAft>
+                <a:spcPct val="0"/>
+              </a:spcAft>
+              <a:defRPr>
+                <a:solidFill>
+                  <a:schemeClr val="tx1"/>
+                </a:solidFill>
+                <a:latin typeface="Calibri" panose="020F0502020204030204" pitchFamily="34" charset="0"/>
+              </a:defRPr>
+            </a:lvl7pPr>
+            <a:lvl8pPr marL="3429000" indent="-228600" eaLnBrk="0" fontAlgn="base" hangingPunct="0">
+              <a:spcBef>
+                <a:spcPct val="0"/>
+              </a:spcBef>
+              <a:spcAft>
+                <a:spcPct val="0"/>
+              </a:spcAft>
+              <a:defRPr>
+                <a:solidFill>
+                  <a:schemeClr val="tx1"/>
+                </a:solidFill>
+                <a:latin typeface="Calibri" panose="020F0502020204030204" pitchFamily="34" charset="0"/>
+              </a:defRPr>
+            </a:lvl8pPr>
+            <a:lvl9pPr marL="3886200" indent="-228600" eaLnBrk="0" fontAlgn="base" hangingPunct="0">
+              <a:spcBef>
+                <a:spcPct val="0"/>
+              </a:spcBef>
+              <a:spcAft>
+                <a:spcPct val="0"/>
+              </a:spcAft>
+              <a:defRPr>
+                <a:solidFill>
+                  <a:schemeClr val="tx1"/>
+                </a:solidFill>
+                <a:latin typeface="Calibri" panose="020F0502020204030204" pitchFamily="34" charset="0"/>
+              </a:defRPr>
+            </a:lvl9pPr>
+          </a:lstStyle>
+          <a:p>
+            <a:pPr algn="ctr" eaLnBrk="1" hangingPunct="1"/>
+            <a:r>
+              <a:rPr lang="en-US" altLang="en-US" sz="1200" dirty="0">
+                <a:latin typeface="Arial" panose="020B0604020202020204" pitchFamily="34" charset="0"/>
+                <a:ea typeface="Amazon Ember" panose="020B0603020204020204" pitchFamily="34" charset="0"/>
+                <a:cs typeface="Arial" panose="020B0604020202020204" pitchFamily="34" charset="0"/>
+              </a:rPr>
+              <a:t>Amazon API Gateway</a:t>
+            </a:r>
+          </a:p>
+          <a:p>
+            <a:pPr algn="ctr" eaLnBrk="1" hangingPunct="1"/>
+            <a:r>
+              <a:rPr lang="en-US" altLang="en-US" sz="1200" dirty="0">
+                <a:latin typeface="Arial" panose="020B0604020202020204" pitchFamily="34" charset="0"/>
+                <a:ea typeface="Amazon Ember" panose="020B0603020204020204" pitchFamily="34" charset="0"/>
+                <a:cs typeface="Arial" panose="020B0604020202020204" pitchFamily="34" charset="0"/>
+              </a:rPr>
+              <a:t>- start/stop db</a:t>
+            </a:r>
+          </a:p>
+        </p:txBody>
+      </p:sp>
+      <p:sp>
+        <p:nvSpPr>
+          <p:cNvPr id="31" name="TextBox 13">
+            <a:extLst>
+              <a:ext uri="{FF2B5EF4-FFF2-40B4-BE49-F238E27FC236}">
+                <a16:creationId xmlns:a16="http://schemas.microsoft.com/office/drawing/2014/main" id="{E1C187D5-937A-3E2D-A5A6-BA77421FC1E8}"/>
+              </a:ext>
+            </a:extLst>
+          </p:cNvPr>
+          <p:cNvSpPr txBox="1">
+            <a:spLocks noChangeArrowheads="1"/>
+          </p:cNvSpPr>
+          <p:nvPr/>
+        </p:nvSpPr>
+        <p:spPr bwMode="auto">
+          <a:xfrm>
+            <a:off x="2401924" y="2892402"/>
+            <a:ext cx="773263" cy="461665"/>
+          </a:xfrm>
+          <a:prstGeom prst="rect">
+            <a:avLst/>
+          </a:prstGeom>
+          <a:noFill/>
+          <a:ln>
+            <a:noFill/>
+          </a:ln>
+          <a:extLst>
+            <a:ext uri="{909E8E84-426E-40DD-AFC4-6F175D3DCCD1}">
+              <a14:hiddenFill xmlns:a14="http://schemas.microsoft.com/office/drawing/2010/main">
+                <a:solidFill>
+                  <a:srgbClr val="FFFFFF"/>
+                </a:solidFill>
+              </a14:hiddenFill>
+            </a:ext>
+            <a:ext uri="{91240B29-F687-4F45-9708-019B960494DF}">
+              <a14:hiddenLine xmlns:a14="http://schemas.microsoft.com/office/drawing/2010/main" w="9525">
+                <a:solidFill>
+                  <a:srgbClr val="000000"/>
+                </a:solidFill>
+                <a:miter lim="800000"/>
+                <a:headEnd/>
+                <a:tailEnd/>
+              </a14:hiddenLine>
+            </a:ext>
+          </a:extLst>
+        </p:spPr>
+        <p:txBody>
+          <a:bodyPr wrap="square">
+            <a:spAutoFit/>
+          </a:bodyPr>
+          <a:lstStyle>
+            <a:lvl1pPr>
+              <a:defRPr>
+                <a:solidFill>
+                  <a:schemeClr val="tx1"/>
+                </a:solidFill>
+                <a:latin typeface="Calibri" panose="020F0502020204030204" pitchFamily="34" charset="0"/>
+              </a:defRPr>
+            </a:lvl1pPr>
+            <a:lvl2pPr marL="742950" indent="-285750">
+              <a:defRPr>
+                <a:solidFill>
+                  <a:schemeClr val="tx1"/>
+                </a:solidFill>
+                <a:latin typeface="Calibri" panose="020F0502020204030204" pitchFamily="34" charset="0"/>
+              </a:defRPr>
+            </a:lvl2pPr>
+            <a:lvl3pPr marL="1143000" indent="-228600">
+              <a:defRPr>
+                <a:solidFill>
+                  <a:schemeClr val="tx1"/>
+                </a:solidFill>
+                <a:latin typeface="Calibri" panose="020F0502020204030204" pitchFamily="34" charset="0"/>
+              </a:defRPr>
+            </a:lvl3pPr>
+            <a:lvl4pPr marL="1600200" indent="-228600">
+              <a:defRPr>
+                <a:solidFill>
+                  <a:schemeClr val="tx1"/>
+                </a:solidFill>
+                <a:latin typeface="Calibri" panose="020F0502020204030204" pitchFamily="34" charset="0"/>
+              </a:defRPr>
+            </a:lvl4pPr>
+            <a:lvl5pPr marL="2057400" indent="-228600">
+              <a:defRPr>
+                <a:solidFill>
+                  <a:schemeClr val="tx1"/>
+                </a:solidFill>
+                <a:latin typeface="Calibri" panose="020F0502020204030204" pitchFamily="34" charset="0"/>
+              </a:defRPr>
+            </a:lvl5pPr>
+            <a:lvl6pPr marL="2514600" indent="-228600" eaLnBrk="0" fontAlgn="base" hangingPunct="0">
+              <a:spcBef>
+                <a:spcPct val="0"/>
+              </a:spcBef>
+              <a:spcAft>
+                <a:spcPct val="0"/>
+              </a:spcAft>
+              <a:defRPr>
+                <a:solidFill>
+                  <a:schemeClr val="tx1"/>
+                </a:solidFill>
+                <a:latin typeface="Calibri" panose="020F0502020204030204" pitchFamily="34" charset="0"/>
+              </a:defRPr>
+            </a:lvl6pPr>
+            <a:lvl7pPr marL="2971800" indent="-228600" eaLnBrk="0" fontAlgn="base" hangingPunct="0">
+              <a:spcBef>
+                <a:spcPct val="0"/>
+              </a:spcBef>
+              <a:spcAft>
+                <a:spcPct val="0"/>
+              </a:spcAft>
+              <a:defRPr>
+                <a:solidFill>
+                  <a:schemeClr val="tx1"/>
+                </a:solidFill>
+                <a:latin typeface="Calibri" panose="020F0502020204030204" pitchFamily="34" charset="0"/>
+              </a:defRPr>
+            </a:lvl7pPr>
+            <a:lvl8pPr marL="3429000" indent="-228600" eaLnBrk="0" fontAlgn="base" hangingPunct="0">
+              <a:spcBef>
+                <a:spcPct val="0"/>
+              </a:spcBef>
+              <a:spcAft>
+                <a:spcPct val="0"/>
+              </a:spcAft>
+              <a:defRPr>
+                <a:solidFill>
+                  <a:schemeClr val="tx1"/>
+                </a:solidFill>
+                <a:latin typeface="Calibri" panose="020F0502020204030204" pitchFamily="34" charset="0"/>
+              </a:defRPr>
+            </a:lvl8pPr>
+            <a:lvl9pPr marL="3886200" indent="-228600" eaLnBrk="0" fontAlgn="base" hangingPunct="0">
+              <a:spcBef>
+                <a:spcPct val="0"/>
+              </a:spcBef>
+              <a:spcAft>
+                <a:spcPct val="0"/>
+              </a:spcAft>
+              <a:defRPr>
+                <a:solidFill>
+                  <a:schemeClr val="tx1"/>
+                </a:solidFill>
+                <a:latin typeface="Calibri" panose="020F0502020204030204" pitchFamily="34" charset="0"/>
+              </a:defRPr>
+            </a:lvl9pPr>
+          </a:lstStyle>
+          <a:p>
+            <a:pPr algn="ctr" eaLnBrk="1" hangingPunct="1"/>
+            <a:r>
+              <a:rPr lang="en-US" altLang="en-US" sz="1200" dirty="0">
+                <a:latin typeface="Arial" panose="020B0604020202020204" pitchFamily="34" charset="0"/>
+                <a:cs typeface="Arial" panose="020B0604020202020204" pitchFamily="34" charset="0"/>
+              </a:rPr>
+              <a:t>AWS Lambda</a:t>
+            </a:r>
+          </a:p>
+        </p:txBody>
+      </p:sp>
+      <p:pic>
+        <p:nvPicPr>
+          <p:cNvPr id="32" name="Graphic 10">
+            <a:extLst>
+              <a:ext uri="{FF2B5EF4-FFF2-40B4-BE49-F238E27FC236}">
+                <a16:creationId xmlns:a16="http://schemas.microsoft.com/office/drawing/2014/main" id="{7A999F98-164E-975A-FBB8-98E84583B8F9}"/>
+              </a:ext>
+            </a:extLst>
+          </p:cNvPr>
+          <p:cNvPicPr>
+            <a:picLocks noChangeAspect="1" noChangeArrowheads="1"/>
+          </p:cNvPicPr>
+          <p:nvPr/>
+        </p:nvPicPr>
+        <p:blipFill>
+          <a:blip r:embed="rId6">
+            <a:extLst>
+              <a:ext uri="{96DAC541-7B7A-43D3-8B79-37D633B846F1}">
+                <asvg:svgBlip xmlns:asvg="http://schemas.microsoft.com/office/drawing/2016/SVG/main" r:embed="rId7"/>
+              </a:ext>
+            </a:extLst>
+          </a:blip>
+          <a:srcRect/>
+          <a:stretch/>
+        </p:blipFill>
+        <p:spPr bwMode="auto">
+          <a:xfrm>
+            <a:off x="2594662" y="2445083"/>
+            <a:ext cx="413567" cy="413567"/>
+          </a:xfrm>
+          <a:prstGeom prst="rect">
+            <a:avLst/>
+          </a:prstGeom>
+          <a:noFill/>
+          <a:ln>
+            <a:noFill/>
+          </a:ln>
+          <a:extLst>
+            <a:ext uri="{909E8E84-426E-40DD-AFC4-6F175D3DCCD1}">
+              <a14:hiddenFill xmlns:a14="http://schemas.microsoft.com/office/drawing/2010/main">
+                <a:solidFill>
+                  <a:srgbClr val="FFFFFF"/>
+                </a:solidFill>
+              </a14:hiddenFill>
+            </a:ext>
+            <a:ext uri="{91240B29-F687-4F45-9708-019B960494DF}">
+              <a14:hiddenLine xmlns:a14="http://schemas.microsoft.com/office/drawing/2010/main" w="9525">
+                <a:solidFill>
+                  <a:srgbClr val="000000"/>
+                </a:solidFill>
+                <a:miter lim="800000"/>
+                <a:headEnd/>
+                <a:tailEnd/>
+              </a14:hiddenLine>
+            </a:ext>
+          </a:extLst>
+        </p:spPr>
+      </p:pic>
+      <p:cxnSp>
+        <p:nvCxnSpPr>
+          <p:cNvPr id="33" name="Straight Arrow Connector 32">
+            <a:extLst>
+              <a:ext uri="{FF2B5EF4-FFF2-40B4-BE49-F238E27FC236}">
+                <a16:creationId xmlns:a16="http://schemas.microsoft.com/office/drawing/2014/main" id="{ABCBFEF7-5AC5-8BBA-3EE7-3785DF06B1E9}"/>
+              </a:ext>
+            </a:extLst>
+          </p:cNvPr>
+          <p:cNvCxnSpPr>
+            <a:cxnSpLocks/>
+          </p:cNvCxnSpPr>
+          <p:nvPr/>
+        </p:nvCxnSpPr>
+        <p:spPr>
+          <a:xfrm>
+            <a:off x="2827306" y="2102512"/>
+            <a:ext cx="0" cy="268402"/>
+          </a:xfrm>
+          <a:prstGeom prst="straightConnector1">
+            <a:avLst/>
+          </a:prstGeom>
+          <a:ln w="15875">
+            <a:solidFill>
+              <a:schemeClr val="tx1"/>
+            </a:solidFill>
+            <a:headEnd type="none" w="med" len="sm"/>
+            <a:tailEnd type="arrow" w="med" len="sm"/>
+          </a:ln>
+        </p:spPr>
+        <p:style>
+          <a:lnRef idx="1">
+            <a:schemeClr val="accent1"/>
+          </a:lnRef>
+          <a:fillRef idx="0">
+            <a:schemeClr val="accent1"/>
+          </a:fillRef>
+          <a:effectRef idx="0">
+            <a:schemeClr val="accent1"/>
+          </a:effectRef>
+          <a:fontRef idx="minor">
+            <a:schemeClr val="tx1"/>
+          </a:fontRef>
+        </p:style>
+      </p:cxnSp>
+      <p:cxnSp>
+        <p:nvCxnSpPr>
+          <p:cNvPr id="35" name="Straight Arrow Connector 34">
+            <a:extLst>
+              <a:ext uri="{FF2B5EF4-FFF2-40B4-BE49-F238E27FC236}">
+                <a16:creationId xmlns:a16="http://schemas.microsoft.com/office/drawing/2014/main" id="{D19CD9E9-555A-1BD8-D884-23858D3B2CC5}"/>
+              </a:ext>
+            </a:extLst>
+          </p:cNvPr>
+          <p:cNvCxnSpPr>
+            <a:cxnSpLocks/>
+          </p:cNvCxnSpPr>
+          <p:nvPr/>
+        </p:nvCxnSpPr>
+        <p:spPr>
+          <a:xfrm>
+            <a:off x="3175187" y="2651866"/>
+            <a:ext cx="782278" cy="0"/>
+          </a:xfrm>
+          <a:prstGeom prst="straightConnector1">
+            <a:avLst/>
+          </a:prstGeom>
+          <a:ln w="15875">
+            <a:solidFill>
+              <a:schemeClr val="tx1"/>
+            </a:solidFill>
+            <a:headEnd type="arrow" w="med" len="sm"/>
+            <a:tailEnd type="arrow" w="med" len="sm"/>
+          </a:ln>
+        </p:spPr>
+        <p:style>
+          <a:lnRef idx="1">
+            <a:schemeClr val="accent1"/>
+          </a:lnRef>
+          <a:fillRef idx="0">
+            <a:schemeClr val="accent1"/>
+          </a:fillRef>
+          <a:effectRef idx="0">
+            <a:schemeClr val="accent1"/>
+          </a:effectRef>
+          <a:fontRef idx="minor">
+            <a:schemeClr val="tx1"/>
+          </a:fontRef>
+        </p:style>
+      </p:cxnSp>
+      <p:pic>
+        <p:nvPicPr>
+          <p:cNvPr id="36" name="Graphic 6">
+            <a:extLst>
+              <a:ext uri="{FF2B5EF4-FFF2-40B4-BE49-F238E27FC236}">
+                <a16:creationId xmlns:a16="http://schemas.microsoft.com/office/drawing/2014/main" id="{85822111-7732-30F3-D058-A074C49A0525}"/>
+              </a:ext>
+            </a:extLst>
+          </p:cNvPr>
+          <p:cNvPicPr>
+            <a:picLocks noChangeAspect="1" noChangeArrowheads="1"/>
+          </p:cNvPicPr>
+          <p:nvPr/>
+        </p:nvPicPr>
+        <p:blipFill>
+          <a:blip r:embed="rId8">
+            <a:extLst>
+              <a:ext uri="{96DAC541-7B7A-43D3-8B79-37D633B846F1}">
+                <asvg:svgBlip xmlns:asvg="http://schemas.microsoft.com/office/drawing/2016/SVG/main" r:embed="rId9"/>
+              </a:ext>
+            </a:extLst>
+          </a:blip>
+          <a:srcRect/>
+          <a:stretch/>
+        </p:blipFill>
+        <p:spPr bwMode="auto">
+          <a:xfrm>
+            <a:off x="4330246" y="2426459"/>
+            <a:ext cx="413567" cy="413567"/>
+          </a:xfrm>
+          <a:prstGeom prst="rect">
+            <a:avLst/>
+          </a:prstGeom>
+          <a:noFill/>
+          <a:ln>
+            <a:noFill/>
+          </a:ln>
+          <a:extLst>
+            <a:ext uri="{909E8E84-426E-40DD-AFC4-6F175D3DCCD1}">
+              <a14:hiddenFill xmlns:a14="http://schemas.microsoft.com/office/drawing/2010/main">
+                <a:solidFill>
+                  <a:srgbClr val="FFFFFF"/>
+                </a:solidFill>
+              </a14:hiddenFill>
+            </a:ext>
+            <a:ext uri="{91240B29-F687-4F45-9708-019B960494DF}">
+              <a14:hiddenLine xmlns:a14="http://schemas.microsoft.com/office/drawing/2010/main" w="9525">
+                <a:solidFill>
+                  <a:srgbClr val="000000"/>
+                </a:solidFill>
+                <a:miter lim="800000"/>
+                <a:headEnd/>
+                <a:tailEnd/>
+              </a14:hiddenLine>
+            </a:ext>
+          </a:extLst>
+        </p:spPr>
+      </p:pic>
+      <p:sp>
+        <p:nvSpPr>
+          <p:cNvPr id="37" name="TextBox 9">
+            <a:extLst>
+              <a:ext uri="{FF2B5EF4-FFF2-40B4-BE49-F238E27FC236}">
+                <a16:creationId xmlns:a16="http://schemas.microsoft.com/office/drawing/2014/main" id="{0E6C31F8-66C7-BF4B-ADF4-57F9C03E7050}"/>
+              </a:ext>
+            </a:extLst>
+          </p:cNvPr>
+          <p:cNvSpPr txBox="1">
+            <a:spLocks noChangeArrowheads="1"/>
+          </p:cNvSpPr>
+          <p:nvPr/>
+        </p:nvSpPr>
+        <p:spPr bwMode="auto">
+          <a:xfrm>
+            <a:off x="3547968" y="2840027"/>
+            <a:ext cx="2172269" cy="646331"/>
+          </a:xfrm>
+          <a:prstGeom prst="rect">
+            <a:avLst/>
+          </a:prstGeom>
+          <a:noFill/>
+          <a:ln>
+            <a:noFill/>
+          </a:ln>
+          <a:extLst>
+            <a:ext uri="{909E8E84-426E-40DD-AFC4-6F175D3DCCD1}">
+              <a14:hiddenFill xmlns:a14="http://schemas.microsoft.com/office/drawing/2010/main">
+                <a:solidFill>
+                  <a:srgbClr val="FFFFFF"/>
+                </a:solidFill>
+              </a14:hiddenFill>
+            </a:ext>
+            <a:ext uri="{91240B29-F687-4F45-9708-019B960494DF}">
+              <a14:hiddenLine xmlns:a14="http://schemas.microsoft.com/office/drawing/2010/main" w="9525">
+                <a:solidFill>
+                  <a:srgbClr val="000000"/>
+                </a:solidFill>
+                <a:miter lim="800000"/>
+                <a:headEnd/>
+                <a:tailEnd/>
+              </a14:hiddenLine>
+            </a:ext>
+          </a:extLst>
+        </p:spPr>
+        <p:txBody>
+          <a:bodyPr wrap="square">
+            <a:spAutoFit/>
+          </a:bodyPr>
+          <a:lstStyle>
+            <a:lvl1pPr>
+              <a:defRPr>
+                <a:solidFill>
+                  <a:schemeClr val="tx1"/>
+                </a:solidFill>
+                <a:latin typeface="Calibri" panose="020F0502020204030204" pitchFamily="34" charset="0"/>
+              </a:defRPr>
+            </a:lvl1pPr>
+            <a:lvl2pPr marL="742950" indent="-285750">
+              <a:defRPr>
+                <a:solidFill>
+                  <a:schemeClr val="tx1"/>
+                </a:solidFill>
+                <a:latin typeface="Calibri" panose="020F0502020204030204" pitchFamily="34" charset="0"/>
+              </a:defRPr>
+            </a:lvl2pPr>
+            <a:lvl3pPr marL="1143000" indent="-228600">
+              <a:defRPr>
+                <a:solidFill>
+                  <a:schemeClr val="tx1"/>
+                </a:solidFill>
+                <a:latin typeface="Calibri" panose="020F0502020204030204" pitchFamily="34" charset="0"/>
+              </a:defRPr>
+            </a:lvl3pPr>
+            <a:lvl4pPr marL="1600200" indent="-228600">
+              <a:defRPr>
+                <a:solidFill>
+                  <a:schemeClr val="tx1"/>
+                </a:solidFill>
+                <a:latin typeface="Calibri" panose="020F0502020204030204" pitchFamily="34" charset="0"/>
+              </a:defRPr>
+            </a:lvl4pPr>
+            <a:lvl5pPr marL="2057400" indent="-228600">
+              <a:defRPr>
+                <a:solidFill>
+                  <a:schemeClr val="tx1"/>
+                </a:solidFill>
+                <a:latin typeface="Calibri" panose="020F0502020204030204" pitchFamily="34" charset="0"/>
+              </a:defRPr>
+            </a:lvl5pPr>
+            <a:lvl6pPr marL="2514600" indent="-228600" eaLnBrk="0" fontAlgn="base" hangingPunct="0">
+              <a:spcBef>
+                <a:spcPct val="0"/>
+              </a:spcBef>
+              <a:spcAft>
+                <a:spcPct val="0"/>
+              </a:spcAft>
+              <a:defRPr>
+                <a:solidFill>
+                  <a:schemeClr val="tx1"/>
+                </a:solidFill>
+                <a:latin typeface="Calibri" panose="020F0502020204030204" pitchFamily="34" charset="0"/>
+              </a:defRPr>
+            </a:lvl6pPr>
+            <a:lvl7pPr marL="2971800" indent="-228600" eaLnBrk="0" fontAlgn="base" hangingPunct="0">
+              <a:spcBef>
+                <a:spcPct val="0"/>
+              </a:spcBef>
+              <a:spcAft>
+                <a:spcPct val="0"/>
+              </a:spcAft>
+              <a:defRPr>
+                <a:solidFill>
+                  <a:schemeClr val="tx1"/>
+                </a:solidFill>
+                <a:latin typeface="Calibri" panose="020F0502020204030204" pitchFamily="34" charset="0"/>
+              </a:defRPr>
+            </a:lvl7pPr>
+            <a:lvl8pPr marL="3429000" indent="-228600" eaLnBrk="0" fontAlgn="base" hangingPunct="0">
+              <a:spcBef>
+                <a:spcPct val="0"/>
+              </a:spcBef>
+              <a:spcAft>
+                <a:spcPct val="0"/>
+              </a:spcAft>
+              <a:defRPr>
+                <a:solidFill>
+                  <a:schemeClr val="tx1"/>
+                </a:solidFill>
+                <a:latin typeface="Calibri" panose="020F0502020204030204" pitchFamily="34" charset="0"/>
+              </a:defRPr>
+            </a:lvl8pPr>
+            <a:lvl9pPr marL="3886200" indent="-228600" eaLnBrk="0" fontAlgn="base" hangingPunct="0">
+              <a:spcBef>
+                <a:spcPct val="0"/>
+              </a:spcBef>
+              <a:spcAft>
+                <a:spcPct val="0"/>
+              </a:spcAft>
+              <a:defRPr>
+                <a:solidFill>
+                  <a:schemeClr val="tx1"/>
+                </a:solidFill>
+                <a:latin typeface="Calibri" panose="020F0502020204030204" pitchFamily="34" charset="0"/>
+              </a:defRPr>
+            </a:lvl9pPr>
+          </a:lstStyle>
+          <a:p>
+            <a:pPr algn="ctr" eaLnBrk="1" hangingPunct="1"/>
+            <a:r>
+              <a:rPr lang="en-US" altLang="en-US" sz="1200" dirty="0">
+                <a:latin typeface="Arial" panose="020B0604020202020204" pitchFamily="34" charset="0"/>
+                <a:ea typeface="Amazon Ember" panose="020B0603020204020204" pitchFamily="34" charset="0"/>
+                <a:cs typeface="Arial" panose="020B0604020202020204" pitchFamily="34" charset="0"/>
+              </a:rPr>
+              <a:t>Amazon Relational</a:t>
+            </a:r>
+          </a:p>
+          <a:p>
+            <a:pPr algn="ctr" eaLnBrk="1" hangingPunct="1"/>
+            <a:r>
+              <a:rPr lang="en-US" altLang="en-US" sz="1200" dirty="0">
+                <a:latin typeface="Arial" panose="020B0604020202020204" pitchFamily="34" charset="0"/>
+                <a:ea typeface="Amazon Ember" panose="020B0603020204020204" pitchFamily="34" charset="0"/>
+                <a:cs typeface="Arial" panose="020B0604020202020204" pitchFamily="34" charset="0"/>
+              </a:rPr>
+              <a:t> Database Service</a:t>
+            </a:r>
+          </a:p>
+          <a:p>
+            <a:pPr algn="ctr" eaLnBrk="1" hangingPunct="1"/>
+            <a:r>
+              <a:rPr lang="en-US" altLang="en-US" sz="1200" dirty="0">
+                <a:latin typeface="Arial" panose="020B0604020202020204" pitchFamily="34" charset="0"/>
+                <a:ea typeface="Amazon Ember" panose="020B0603020204020204" pitchFamily="34" charset="0"/>
+                <a:cs typeface="Arial" panose="020B0604020202020204" pitchFamily="34" charset="0"/>
+              </a:rPr>
+              <a:t> (Amazon RDS)</a:t>
+            </a:r>
+          </a:p>
+        </p:txBody>
+      </p:sp>
+      <p:sp>
+        <p:nvSpPr>
+          <p:cNvPr id="52" name="Rectangle 51">
+            <a:extLst>
+              <a:ext uri="{FF2B5EF4-FFF2-40B4-BE49-F238E27FC236}">
+                <a16:creationId xmlns:a16="http://schemas.microsoft.com/office/drawing/2014/main" id="{B8B7824D-1FAA-DA38-F9C2-032B3FD8E3CA}"/>
+              </a:ext>
+            </a:extLst>
+          </p:cNvPr>
+          <p:cNvSpPr/>
+          <p:nvPr/>
+        </p:nvSpPr>
+        <p:spPr>
+          <a:xfrm>
+            <a:off x="7043890" y="370743"/>
+            <a:ext cx="3818373" cy="1299563"/>
+          </a:xfrm>
+          <a:prstGeom prst="rect">
+            <a:avLst/>
+          </a:prstGeom>
+        </p:spPr>
+        <p:style>
+          <a:lnRef idx="2">
+            <a:schemeClr val="accent6"/>
+          </a:lnRef>
+          <a:fillRef idx="1">
+            <a:schemeClr val="lt1"/>
+          </a:fillRef>
+          <a:effectRef idx="0">
+            <a:schemeClr val="accent6"/>
+          </a:effectRef>
+          <a:fontRef idx="minor">
+            <a:schemeClr val="dk1"/>
+          </a:fontRef>
+        </p:style>
+        <p:txBody>
+          <a:bodyPr rtlCol="0" anchor="ctr"/>
+          <a:lstStyle/>
+          <a:p>
+            <a:r>
+              <a:rPr lang="en-US" sz="1200" dirty="0">
+                <a:solidFill>
+                  <a:schemeClr val="accent5">
+                    <a:lumMod val="75000"/>
+                  </a:schemeClr>
+                </a:solidFill>
+              </a:rPr>
+              <a:t>AWS Amplify and Amazon CloudFront:</a:t>
+            </a:r>
+          </a:p>
+          <a:p>
+            <a:r>
+              <a:rPr lang="en-US" sz="1200" dirty="0"/>
+              <a:t>AWS Amplify is used to host and deploy the static web assets (HTML, CSS, JS) of the React application.</a:t>
+            </a:r>
+          </a:p>
+          <a:p>
+            <a:r>
+              <a:rPr lang="en-US" sz="1200" dirty="0"/>
+              <a:t>Amazon CloudFront is connected to AWS Amplify to serve these static assets quickly to users, improving the load time of your application.</a:t>
+            </a:r>
+          </a:p>
+        </p:txBody>
+      </p:sp>
+      <p:sp>
+        <p:nvSpPr>
+          <p:cNvPr id="53" name="Rectangle 52">
+            <a:extLst>
+              <a:ext uri="{FF2B5EF4-FFF2-40B4-BE49-F238E27FC236}">
+                <a16:creationId xmlns:a16="http://schemas.microsoft.com/office/drawing/2014/main" id="{B89EC526-FABF-E683-AA0B-3BE25718043C}"/>
+              </a:ext>
+            </a:extLst>
+          </p:cNvPr>
+          <p:cNvSpPr/>
+          <p:nvPr/>
+        </p:nvSpPr>
+        <p:spPr>
+          <a:xfrm>
+            <a:off x="7043890" y="1721133"/>
+            <a:ext cx="3818373" cy="1299563"/>
+          </a:xfrm>
+          <a:prstGeom prst="rect">
+            <a:avLst/>
+          </a:prstGeom>
+        </p:spPr>
+        <p:style>
+          <a:lnRef idx="2">
+            <a:schemeClr val="accent6"/>
+          </a:lnRef>
+          <a:fillRef idx="1">
+            <a:schemeClr val="lt1"/>
+          </a:fillRef>
+          <a:effectRef idx="0">
+            <a:schemeClr val="accent6"/>
+          </a:effectRef>
+          <a:fontRef idx="minor">
+            <a:schemeClr val="dk1"/>
+          </a:fontRef>
+        </p:style>
+        <p:txBody>
+          <a:bodyPr rtlCol="0" anchor="ctr"/>
+          <a:lstStyle/>
+          <a:p>
+            <a:r>
+              <a:rPr lang="en-US" sz="1200" dirty="0">
+                <a:solidFill>
+                  <a:schemeClr val="accent4">
+                    <a:lumMod val="75000"/>
+                  </a:schemeClr>
+                </a:solidFill>
+              </a:rPr>
+              <a:t>Amazon API Gateway:</a:t>
+            </a:r>
+          </a:p>
+          <a:p>
+            <a:r>
+              <a:rPr lang="en-US" sz="1200" dirty="0"/>
+              <a:t>Below AWS Amplify and Amazon CloudFront, Amazon API Gateway is placed to create, publish, and secure APIs.</a:t>
+            </a:r>
+          </a:p>
+          <a:p>
+            <a:r>
+              <a:rPr lang="en-US" sz="1200" dirty="0"/>
+              <a:t>It acts as a front door for applications to access data, logic, or functionality from the backend services, such as workloads running on AWS Lambda.</a:t>
+            </a:r>
+          </a:p>
+        </p:txBody>
+      </p:sp>
+      <p:sp>
+        <p:nvSpPr>
+          <p:cNvPr id="54" name="Rectangle 53">
+            <a:extLst>
+              <a:ext uri="{FF2B5EF4-FFF2-40B4-BE49-F238E27FC236}">
+                <a16:creationId xmlns:a16="http://schemas.microsoft.com/office/drawing/2014/main" id="{556D58EE-C944-C43A-706F-DB1E9D566E31}"/>
+              </a:ext>
+            </a:extLst>
+          </p:cNvPr>
+          <p:cNvSpPr/>
+          <p:nvPr/>
+        </p:nvSpPr>
+        <p:spPr>
+          <a:xfrm>
+            <a:off x="7043890" y="3080716"/>
+            <a:ext cx="3818373" cy="1299563"/>
+          </a:xfrm>
+          <a:prstGeom prst="rect">
+            <a:avLst/>
+          </a:prstGeom>
+        </p:spPr>
+        <p:style>
+          <a:lnRef idx="2">
+            <a:schemeClr val="accent6"/>
+          </a:lnRef>
+          <a:fillRef idx="1">
+            <a:schemeClr val="lt1"/>
+          </a:fillRef>
+          <a:effectRef idx="0">
+            <a:schemeClr val="accent6"/>
+          </a:effectRef>
+          <a:fontRef idx="minor">
+            <a:schemeClr val="dk1"/>
+          </a:fontRef>
+        </p:style>
+        <p:txBody>
+          <a:bodyPr rtlCol="0" anchor="ctr"/>
+          <a:lstStyle/>
+          <a:p>
+            <a:r>
+              <a:rPr lang="en-US" sz="1050" dirty="0">
+                <a:solidFill>
+                  <a:schemeClr val="accent6">
+                    <a:lumMod val="75000"/>
+                  </a:schemeClr>
+                </a:solidFill>
+              </a:rPr>
+              <a:t>AWS Lambda and Amazon RDS:</a:t>
+            </a:r>
+          </a:p>
+          <a:p>
+            <a:r>
+              <a:rPr lang="en-US" sz="1050" dirty="0"/>
+              <a:t>AWS Lambda is connected to the API Gateway and is responsible for running the backend code (Spring Boot) in response to HTTP requests.</a:t>
+            </a:r>
+          </a:p>
+          <a:p>
+            <a:r>
+              <a:rPr lang="en-US" sz="1050" dirty="0"/>
+              <a:t>Amazon RDS is connected to AWS Lambda and acts as a relational database service to store user profiles, property listings, etc.</a:t>
+            </a:r>
+          </a:p>
+          <a:p>
+            <a:r>
+              <a:rPr lang="en-US" sz="1050" dirty="0"/>
+              <a:t>AWS Lambda retrieves or stores data in Amazon RDS based on the incoming requests from the API Gateway.</a:t>
+            </a:r>
+          </a:p>
+        </p:txBody>
+      </p:sp>
+      <p:sp>
+        <p:nvSpPr>
+          <p:cNvPr id="55" name="Rectangle 54">
+            <a:extLst>
+              <a:ext uri="{FF2B5EF4-FFF2-40B4-BE49-F238E27FC236}">
+                <a16:creationId xmlns:a16="http://schemas.microsoft.com/office/drawing/2014/main" id="{6AA0BA42-A7A3-A22B-9E2D-88CE474D1078}"/>
+              </a:ext>
+            </a:extLst>
+          </p:cNvPr>
+          <p:cNvSpPr/>
+          <p:nvPr/>
+        </p:nvSpPr>
+        <p:spPr>
+          <a:xfrm>
+            <a:off x="7043889" y="4422484"/>
+            <a:ext cx="3818373" cy="1114505"/>
+          </a:xfrm>
+          <a:prstGeom prst="rect">
+            <a:avLst/>
+          </a:prstGeom>
+        </p:spPr>
+        <p:style>
+          <a:lnRef idx="2">
+            <a:schemeClr val="accent6"/>
+          </a:lnRef>
+          <a:fillRef idx="1">
+            <a:schemeClr val="lt1"/>
+          </a:fillRef>
+          <a:effectRef idx="0">
+            <a:schemeClr val="accent6"/>
+          </a:effectRef>
+          <a:fontRef idx="minor">
+            <a:schemeClr val="dk1"/>
+          </a:fontRef>
+        </p:style>
+        <p:txBody>
+          <a:bodyPr rtlCol="0" anchor="ctr"/>
+          <a:lstStyle/>
+          <a:p>
+            <a:r>
+              <a:rPr lang="en-US" sz="1200" dirty="0">
+                <a:solidFill>
+                  <a:schemeClr val="accent2">
+                    <a:lumMod val="75000"/>
+                  </a:schemeClr>
+                </a:solidFill>
+              </a:rPr>
+              <a:t>Amazon S3:</a:t>
+            </a:r>
+          </a:p>
+          <a:p>
+            <a:r>
+              <a:rPr lang="en-US" sz="1200" dirty="0"/>
+              <a:t>Below AWS Lambda, Amazon S3 is placed to store datasets and other large files.</a:t>
+            </a:r>
+          </a:p>
+          <a:p>
+            <a:r>
+              <a:rPr lang="en-US" sz="1200" dirty="0"/>
+              <a:t>It acts as a object storage (scalable) to store and retrieve any amount of data at any time.</a:t>
+            </a:r>
+          </a:p>
+        </p:txBody>
+      </p:sp>
+      <p:sp>
+        <p:nvSpPr>
+          <p:cNvPr id="58" name="Rectangle 57">
+            <a:extLst>
+              <a:ext uri="{FF2B5EF4-FFF2-40B4-BE49-F238E27FC236}">
+                <a16:creationId xmlns:a16="http://schemas.microsoft.com/office/drawing/2014/main" id="{3125082E-3326-5915-9EA4-03674981637A}"/>
+              </a:ext>
+            </a:extLst>
+          </p:cNvPr>
+          <p:cNvSpPr/>
+          <p:nvPr/>
+        </p:nvSpPr>
+        <p:spPr>
+          <a:xfrm>
+            <a:off x="7043889" y="5579194"/>
+            <a:ext cx="3818373" cy="1114505"/>
+          </a:xfrm>
+          <a:prstGeom prst="rect">
+            <a:avLst/>
+          </a:prstGeom>
+        </p:spPr>
+        <p:style>
+          <a:lnRef idx="2">
+            <a:schemeClr val="accent6"/>
+          </a:lnRef>
+          <a:fillRef idx="1">
+            <a:schemeClr val="lt1"/>
+          </a:fillRef>
+          <a:effectRef idx="0">
+            <a:schemeClr val="accent6"/>
+          </a:effectRef>
+          <a:fontRef idx="minor">
+            <a:schemeClr val="dk1"/>
+          </a:fontRef>
+        </p:style>
+        <p:txBody>
+          <a:bodyPr rtlCol="0" anchor="ctr"/>
+          <a:lstStyle/>
+          <a:p>
+            <a:r>
+              <a:rPr lang="en-US" sz="1200" dirty="0">
+                <a:solidFill>
+                  <a:schemeClr val="accent4">
+                    <a:lumMod val="75000"/>
+                  </a:schemeClr>
+                </a:solidFill>
+              </a:rPr>
+              <a:t>Amazon SageMaker:</a:t>
+            </a:r>
+          </a:p>
+          <a:p>
+            <a:r>
+              <a:rPr lang="en-US" sz="1100" dirty="0">
+                <a:solidFill>
+                  <a:schemeClr val="tx1"/>
+                </a:solidFill>
+              </a:rPr>
+              <a:t>Amazon SageMaker is connected to Amazon S3 and is used for developing, training, and deploying machine learning models.</a:t>
+            </a:r>
+          </a:p>
+          <a:p>
+            <a:r>
+              <a:rPr lang="en-US" sz="1100" dirty="0">
+                <a:solidFill>
+                  <a:schemeClr val="tx1"/>
+                </a:solidFill>
+              </a:rPr>
+              <a:t>It utilizes the datasets stored in Amazon S3 for training machine learning models and deploying them to make predictions or </a:t>
+            </a:r>
+            <a:r>
+              <a:rPr lang="en-US" sz="1100" dirty="0" err="1">
+                <a:solidFill>
+                  <a:schemeClr val="tx1"/>
+                </a:solidFill>
+              </a:rPr>
+              <a:t>analyse</a:t>
+            </a:r>
+            <a:endParaRPr lang="en-US" sz="1100" dirty="0">
+              <a:solidFill>
+                <a:schemeClr val="tx1"/>
+              </a:solidFill>
+            </a:endParaRPr>
+          </a:p>
+        </p:txBody>
+      </p:sp>
+      <p:pic>
+        <p:nvPicPr>
+          <p:cNvPr id="2" name="Graphic 24">
+            <a:extLst>
+              <a:ext uri="{FF2B5EF4-FFF2-40B4-BE49-F238E27FC236}">
+                <a16:creationId xmlns:a16="http://schemas.microsoft.com/office/drawing/2014/main" id="{57DCEEAA-FB88-756F-883C-53B1397B995A}"/>
+              </a:ext>
+            </a:extLst>
+          </p:cNvPr>
+          <p:cNvPicPr>
+            <a:picLocks noChangeAspect="1" noChangeArrowheads="1"/>
+          </p:cNvPicPr>
+          <p:nvPr/>
+        </p:nvPicPr>
+        <p:blipFill>
+          <a:blip r:embed="rId10">
+            <a:extLst>
+              <a:ext uri="{96DAC541-7B7A-43D3-8B79-37D633B846F1}">
+                <asvg:svgBlip xmlns:asvg="http://schemas.microsoft.com/office/drawing/2016/SVG/main" r:embed="rId11"/>
+              </a:ext>
+            </a:extLst>
+          </a:blip>
+          <a:srcRect/>
+          <a:stretch/>
+        </p:blipFill>
+        <p:spPr bwMode="auto">
+          <a:xfrm>
+            <a:off x="2605315" y="3696106"/>
+            <a:ext cx="507780" cy="507780"/>
+          </a:xfrm>
+          <a:prstGeom prst="rect">
+            <a:avLst/>
+          </a:prstGeom>
+          <a:noFill/>
+          <a:ln>
+            <a:noFill/>
+          </a:ln>
+          <a:extLst>
+            <a:ext uri="{909E8E84-426E-40DD-AFC4-6F175D3DCCD1}">
+              <a14:hiddenFill xmlns:a14="http://schemas.microsoft.com/office/drawing/2010/main">
+                <a:solidFill>
+                  <a:srgbClr val="FFFFFF"/>
+                </a:solidFill>
+              </a14:hiddenFill>
+            </a:ext>
+            <a:ext uri="{91240B29-F687-4F45-9708-019B960494DF}">
+              <a14:hiddenLine xmlns:a14="http://schemas.microsoft.com/office/drawing/2010/main" w="9525">
+                <a:solidFill>
+                  <a:srgbClr val="000000"/>
+                </a:solidFill>
+                <a:miter lim="800000"/>
+                <a:headEnd/>
+                <a:tailEnd/>
+              </a14:hiddenLine>
+            </a:ext>
+          </a:extLst>
+        </p:spPr>
+      </p:pic>
+      <p:pic>
+        <p:nvPicPr>
+          <p:cNvPr id="3" name="Graphic 17">
+            <a:extLst>
+              <a:ext uri="{FF2B5EF4-FFF2-40B4-BE49-F238E27FC236}">
+                <a16:creationId xmlns:a16="http://schemas.microsoft.com/office/drawing/2014/main" id="{6BAC38C3-48EA-30E5-49D5-D8F6D5BFF326}"/>
+              </a:ext>
+            </a:extLst>
+          </p:cNvPr>
+          <p:cNvPicPr>
+            <a:picLocks noChangeAspect="1" noChangeArrowheads="1"/>
+          </p:cNvPicPr>
+          <p:nvPr/>
+        </p:nvPicPr>
+        <p:blipFill>
+          <a:blip r:embed="rId12">
+            <a:extLst>
+              <a:ext uri="{96DAC541-7B7A-43D3-8B79-37D633B846F1}">
+                <asvg:svgBlip xmlns:asvg="http://schemas.microsoft.com/office/drawing/2016/SVG/main" r:embed="rId13"/>
+              </a:ext>
+            </a:extLst>
+          </a:blip>
+          <a:srcRect/>
+          <a:stretch/>
+        </p:blipFill>
+        <p:spPr bwMode="auto">
+          <a:xfrm>
+            <a:off x="2624538" y="4967323"/>
+            <a:ext cx="507780" cy="507780"/>
+          </a:xfrm>
+          <a:prstGeom prst="rect">
+            <a:avLst/>
+          </a:prstGeom>
+          <a:noFill/>
+          <a:ln>
+            <a:noFill/>
+          </a:ln>
+          <a:extLst>
+            <a:ext uri="{909E8E84-426E-40DD-AFC4-6F175D3DCCD1}">
+              <a14:hiddenFill xmlns:a14="http://schemas.microsoft.com/office/drawing/2010/main">
+                <a:solidFill>
+                  <a:srgbClr val="FFFFFF"/>
+                </a:solidFill>
+              </a14:hiddenFill>
+            </a:ext>
+            <a:ext uri="{91240B29-F687-4F45-9708-019B960494DF}">
+              <a14:hiddenLine xmlns:a14="http://schemas.microsoft.com/office/drawing/2010/main" w="9525">
+                <a:solidFill>
+                  <a:srgbClr val="000000"/>
+                </a:solidFill>
+                <a:miter lim="800000"/>
+                <a:headEnd/>
+                <a:tailEnd/>
+              </a14:hiddenLine>
+            </a:ext>
+          </a:extLst>
+        </p:spPr>
+      </p:pic>
+      <p:sp>
+        <p:nvSpPr>
+          <p:cNvPr id="12" name="TextBox 13">
+            <a:extLst>
+              <a:ext uri="{FF2B5EF4-FFF2-40B4-BE49-F238E27FC236}">
+                <a16:creationId xmlns:a16="http://schemas.microsoft.com/office/drawing/2014/main" id="{7EF1B457-F1E1-C229-EC26-82003677179C}"/>
+              </a:ext>
+            </a:extLst>
+          </p:cNvPr>
+          <p:cNvSpPr txBox="1">
+            <a:spLocks noChangeArrowheads="1"/>
+          </p:cNvSpPr>
+          <p:nvPr/>
+        </p:nvSpPr>
+        <p:spPr bwMode="auto">
+          <a:xfrm>
+            <a:off x="1897049" y="5501796"/>
+            <a:ext cx="2172269" cy="461665"/>
+          </a:xfrm>
+          <a:prstGeom prst="rect">
+            <a:avLst/>
+          </a:prstGeom>
+          <a:noFill/>
+          <a:ln>
+            <a:noFill/>
+          </a:ln>
+          <a:extLst>
+            <a:ext uri="{909E8E84-426E-40DD-AFC4-6F175D3DCCD1}">
+              <a14:hiddenFill xmlns:a14="http://schemas.microsoft.com/office/drawing/2010/main">
+                <a:solidFill>
+                  <a:srgbClr val="FFFFFF"/>
+                </a:solidFill>
+              </a14:hiddenFill>
+            </a:ext>
+            <a:ext uri="{91240B29-F687-4F45-9708-019B960494DF}">
+              <a14:hiddenLine xmlns:a14="http://schemas.microsoft.com/office/drawing/2010/main" w="9525">
+                <a:solidFill>
+                  <a:srgbClr val="000000"/>
+                </a:solidFill>
+                <a:miter lim="800000"/>
+                <a:headEnd/>
+                <a:tailEnd/>
+              </a14:hiddenLine>
+            </a:ext>
+          </a:extLst>
+        </p:spPr>
+        <p:txBody>
+          <a:bodyPr wrap="square">
+            <a:spAutoFit/>
+          </a:bodyPr>
+          <a:lstStyle>
+            <a:lvl1pPr>
+              <a:defRPr>
+                <a:solidFill>
+                  <a:schemeClr val="tx1"/>
+                </a:solidFill>
+                <a:latin typeface="Calibri" panose="020F0502020204030204" pitchFamily="34" charset="0"/>
+              </a:defRPr>
+            </a:lvl1pPr>
+            <a:lvl2pPr marL="742950" indent="-285750">
+              <a:defRPr>
+                <a:solidFill>
+                  <a:schemeClr val="tx1"/>
+                </a:solidFill>
+                <a:latin typeface="Calibri" panose="020F0502020204030204" pitchFamily="34" charset="0"/>
+              </a:defRPr>
+            </a:lvl2pPr>
+            <a:lvl3pPr marL="1143000" indent="-228600">
+              <a:defRPr>
+                <a:solidFill>
+                  <a:schemeClr val="tx1"/>
+                </a:solidFill>
+                <a:latin typeface="Calibri" panose="020F0502020204030204" pitchFamily="34" charset="0"/>
+              </a:defRPr>
+            </a:lvl3pPr>
+            <a:lvl4pPr marL="1600200" indent="-228600">
+              <a:defRPr>
+                <a:solidFill>
+                  <a:schemeClr val="tx1"/>
+                </a:solidFill>
+                <a:latin typeface="Calibri" panose="020F0502020204030204" pitchFamily="34" charset="0"/>
+              </a:defRPr>
+            </a:lvl4pPr>
+            <a:lvl5pPr marL="2057400" indent="-228600">
+              <a:defRPr>
+                <a:solidFill>
+                  <a:schemeClr val="tx1"/>
+                </a:solidFill>
+                <a:latin typeface="Calibri" panose="020F0502020204030204" pitchFamily="34" charset="0"/>
+              </a:defRPr>
+            </a:lvl5pPr>
+            <a:lvl6pPr marL="2514600" indent="-228600" eaLnBrk="0" fontAlgn="base" hangingPunct="0">
+              <a:spcBef>
+                <a:spcPct val="0"/>
+              </a:spcBef>
+              <a:spcAft>
+                <a:spcPct val="0"/>
+              </a:spcAft>
+              <a:defRPr>
+                <a:solidFill>
+                  <a:schemeClr val="tx1"/>
+                </a:solidFill>
+                <a:latin typeface="Calibri" panose="020F0502020204030204" pitchFamily="34" charset="0"/>
+              </a:defRPr>
+            </a:lvl6pPr>
+            <a:lvl7pPr marL="2971800" indent="-228600" eaLnBrk="0" fontAlgn="base" hangingPunct="0">
+              <a:spcBef>
+                <a:spcPct val="0"/>
+              </a:spcBef>
+              <a:spcAft>
+                <a:spcPct val="0"/>
+              </a:spcAft>
+              <a:defRPr>
+                <a:solidFill>
+                  <a:schemeClr val="tx1"/>
+                </a:solidFill>
+                <a:latin typeface="Calibri" panose="020F0502020204030204" pitchFamily="34" charset="0"/>
+              </a:defRPr>
+            </a:lvl7pPr>
+            <a:lvl8pPr marL="3429000" indent="-228600" eaLnBrk="0" fontAlgn="base" hangingPunct="0">
+              <a:spcBef>
+                <a:spcPct val="0"/>
+              </a:spcBef>
+              <a:spcAft>
+                <a:spcPct val="0"/>
+              </a:spcAft>
+              <a:defRPr>
+                <a:solidFill>
+                  <a:schemeClr val="tx1"/>
+                </a:solidFill>
+                <a:latin typeface="Calibri" panose="020F0502020204030204" pitchFamily="34" charset="0"/>
+              </a:defRPr>
+            </a:lvl8pPr>
+            <a:lvl9pPr marL="3886200" indent="-228600" eaLnBrk="0" fontAlgn="base" hangingPunct="0">
+              <a:spcBef>
+                <a:spcPct val="0"/>
+              </a:spcBef>
+              <a:spcAft>
+                <a:spcPct val="0"/>
+              </a:spcAft>
+              <a:defRPr>
+                <a:solidFill>
+                  <a:schemeClr val="tx1"/>
+                </a:solidFill>
+                <a:latin typeface="Calibri" panose="020F0502020204030204" pitchFamily="34" charset="0"/>
+              </a:defRPr>
+            </a:lvl9pPr>
+          </a:lstStyle>
+          <a:p>
+            <a:pPr algn="ctr" eaLnBrk="1" hangingPunct="1"/>
+            <a:r>
+              <a:rPr lang="en-US" altLang="en-US" sz="1200" dirty="0">
+                <a:latin typeface="Arial" panose="020B0604020202020204" pitchFamily="34" charset="0"/>
+                <a:cs typeface="Arial" panose="020B0604020202020204" pitchFamily="34" charset="0"/>
+              </a:rPr>
+              <a:t>Cloudwatch monitors DB Connections</a:t>
+            </a:r>
+          </a:p>
+        </p:txBody>
+      </p:sp>
+      <p:sp>
+        <p:nvSpPr>
+          <p:cNvPr id="13" name="TextBox 13">
+            <a:extLst>
+              <a:ext uri="{FF2B5EF4-FFF2-40B4-BE49-F238E27FC236}">
+                <a16:creationId xmlns:a16="http://schemas.microsoft.com/office/drawing/2014/main" id="{326C0D65-EF4C-EF5E-73AE-D5D81B6DB989}"/>
+              </a:ext>
+            </a:extLst>
+          </p:cNvPr>
+          <p:cNvSpPr txBox="1">
+            <a:spLocks noChangeArrowheads="1"/>
+          </p:cNvSpPr>
+          <p:nvPr/>
+        </p:nvSpPr>
+        <p:spPr bwMode="auto">
+          <a:xfrm>
+            <a:off x="1956309" y="4243166"/>
+            <a:ext cx="2172269" cy="461665"/>
+          </a:xfrm>
+          <a:prstGeom prst="rect">
+            <a:avLst/>
+          </a:prstGeom>
+          <a:noFill/>
+          <a:ln>
+            <a:noFill/>
+          </a:ln>
+          <a:extLst>
+            <a:ext uri="{909E8E84-426E-40DD-AFC4-6F175D3DCCD1}">
+              <a14:hiddenFill xmlns:a14="http://schemas.microsoft.com/office/drawing/2010/main">
+                <a:solidFill>
+                  <a:srgbClr val="FFFFFF"/>
+                </a:solidFill>
+              </a14:hiddenFill>
+            </a:ext>
+            <a:ext uri="{91240B29-F687-4F45-9708-019B960494DF}">
+              <a14:hiddenLine xmlns:a14="http://schemas.microsoft.com/office/drawing/2010/main" w="9525">
+                <a:solidFill>
+                  <a:srgbClr val="000000"/>
+                </a:solidFill>
+                <a:miter lim="800000"/>
+                <a:headEnd/>
+                <a:tailEnd/>
+              </a14:hiddenLine>
+            </a:ext>
+          </a:extLst>
+        </p:spPr>
+        <p:txBody>
+          <a:bodyPr wrap="square">
+            <a:spAutoFit/>
+          </a:bodyPr>
+          <a:lstStyle>
+            <a:lvl1pPr>
+              <a:defRPr>
+                <a:solidFill>
+                  <a:schemeClr val="tx1"/>
+                </a:solidFill>
+                <a:latin typeface="Calibri" panose="020F0502020204030204" pitchFamily="34" charset="0"/>
+              </a:defRPr>
+            </a:lvl1pPr>
+            <a:lvl2pPr marL="742950" indent="-285750">
+              <a:defRPr>
+                <a:solidFill>
+                  <a:schemeClr val="tx1"/>
+                </a:solidFill>
+                <a:latin typeface="Calibri" panose="020F0502020204030204" pitchFamily="34" charset="0"/>
+              </a:defRPr>
+            </a:lvl2pPr>
+            <a:lvl3pPr marL="1143000" indent="-228600">
+              <a:defRPr>
+                <a:solidFill>
+                  <a:schemeClr val="tx1"/>
+                </a:solidFill>
+                <a:latin typeface="Calibri" panose="020F0502020204030204" pitchFamily="34" charset="0"/>
+              </a:defRPr>
+            </a:lvl3pPr>
+            <a:lvl4pPr marL="1600200" indent="-228600">
+              <a:defRPr>
+                <a:solidFill>
+                  <a:schemeClr val="tx1"/>
+                </a:solidFill>
+                <a:latin typeface="Calibri" panose="020F0502020204030204" pitchFamily="34" charset="0"/>
+              </a:defRPr>
+            </a:lvl4pPr>
+            <a:lvl5pPr marL="2057400" indent="-228600">
+              <a:defRPr>
+                <a:solidFill>
+                  <a:schemeClr val="tx1"/>
+                </a:solidFill>
+                <a:latin typeface="Calibri" panose="020F0502020204030204" pitchFamily="34" charset="0"/>
+              </a:defRPr>
+            </a:lvl5pPr>
+            <a:lvl6pPr marL="2514600" indent="-228600" eaLnBrk="0" fontAlgn="base" hangingPunct="0">
+              <a:spcBef>
+                <a:spcPct val="0"/>
+              </a:spcBef>
+              <a:spcAft>
+                <a:spcPct val="0"/>
+              </a:spcAft>
+              <a:defRPr>
+                <a:solidFill>
+                  <a:schemeClr val="tx1"/>
+                </a:solidFill>
+                <a:latin typeface="Calibri" panose="020F0502020204030204" pitchFamily="34" charset="0"/>
+              </a:defRPr>
+            </a:lvl6pPr>
+            <a:lvl7pPr marL="2971800" indent="-228600" eaLnBrk="0" fontAlgn="base" hangingPunct="0">
+              <a:spcBef>
+                <a:spcPct val="0"/>
+              </a:spcBef>
+              <a:spcAft>
+                <a:spcPct val="0"/>
+              </a:spcAft>
+              <a:defRPr>
+                <a:solidFill>
+                  <a:schemeClr val="tx1"/>
+                </a:solidFill>
+                <a:latin typeface="Calibri" panose="020F0502020204030204" pitchFamily="34" charset="0"/>
+              </a:defRPr>
+            </a:lvl7pPr>
+            <a:lvl8pPr marL="3429000" indent="-228600" eaLnBrk="0" fontAlgn="base" hangingPunct="0">
+              <a:spcBef>
+                <a:spcPct val="0"/>
+              </a:spcBef>
+              <a:spcAft>
+                <a:spcPct val="0"/>
+              </a:spcAft>
+              <a:defRPr>
+                <a:solidFill>
+                  <a:schemeClr val="tx1"/>
+                </a:solidFill>
+                <a:latin typeface="Calibri" panose="020F0502020204030204" pitchFamily="34" charset="0"/>
+              </a:defRPr>
+            </a:lvl8pPr>
+            <a:lvl9pPr marL="3886200" indent="-228600" eaLnBrk="0" fontAlgn="base" hangingPunct="0">
+              <a:spcBef>
+                <a:spcPct val="0"/>
+              </a:spcBef>
+              <a:spcAft>
+                <a:spcPct val="0"/>
+              </a:spcAft>
+              <a:defRPr>
+                <a:solidFill>
+                  <a:schemeClr val="tx1"/>
+                </a:solidFill>
+                <a:latin typeface="Calibri" panose="020F0502020204030204" pitchFamily="34" charset="0"/>
+              </a:defRPr>
+            </a:lvl9pPr>
+          </a:lstStyle>
+          <a:p>
+            <a:pPr algn="ctr" eaLnBrk="1" hangingPunct="1"/>
+            <a:r>
+              <a:rPr lang="en-US" altLang="en-US" sz="1200" dirty="0">
+                <a:latin typeface="Arial" panose="020B0604020202020204" pitchFamily="34" charset="0"/>
+                <a:cs typeface="Arial" panose="020B0604020202020204" pitchFamily="34" charset="0"/>
+              </a:rPr>
+              <a:t>Simple Notification Service</a:t>
+            </a:r>
+            <a:br>
+              <a:rPr lang="en-US" altLang="en-US" sz="1200" dirty="0">
+                <a:latin typeface="Arial" panose="020B0604020202020204" pitchFamily="34" charset="0"/>
+                <a:cs typeface="Arial" panose="020B0604020202020204" pitchFamily="34" charset="0"/>
+              </a:rPr>
+            </a:br>
+            <a:r>
+              <a:rPr lang="en-US" altLang="en-US" sz="1200" dirty="0">
+                <a:latin typeface="Arial" panose="020B0604020202020204" pitchFamily="34" charset="0"/>
+                <a:cs typeface="Arial" panose="020B0604020202020204" pitchFamily="34" charset="0"/>
+              </a:rPr>
+              <a:t>Gets Alert (inactive db)</a:t>
+            </a:r>
+          </a:p>
+        </p:txBody>
+      </p:sp>
+      <p:cxnSp>
+        <p:nvCxnSpPr>
+          <p:cNvPr id="15" name="Straight Arrow Connector 14">
+            <a:extLst>
+              <a:ext uri="{FF2B5EF4-FFF2-40B4-BE49-F238E27FC236}">
+                <a16:creationId xmlns:a16="http://schemas.microsoft.com/office/drawing/2014/main" id="{8106832B-0309-64C2-D713-8BC6660C2CEF}"/>
+              </a:ext>
+            </a:extLst>
+          </p:cNvPr>
+          <p:cNvCxnSpPr>
+            <a:cxnSpLocks/>
+          </p:cNvCxnSpPr>
+          <p:nvPr/>
+        </p:nvCxnSpPr>
+        <p:spPr>
+          <a:xfrm flipV="1">
+            <a:off x="2878428" y="4652461"/>
+            <a:ext cx="0" cy="292905"/>
+          </a:xfrm>
+          <a:prstGeom prst="straightConnector1">
+            <a:avLst/>
+          </a:prstGeom>
+          <a:ln w="15875">
+            <a:solidFill>
+              <a:schemeClr val="tx1"/>
+            </a:solidFill>
+            <a:headEnd type="none" w="med" len="sm"/>
+            <a:tailEnd type="arrow" w="med" len="sm"/>
+          </a:ln>
+        </p:spPr>
+        <p:style>
+          <a:lnRef idx="1">
+            <a:schemeClr val="accent1"/>
+          </a:lnRef>
+          <a:fillRef idx="0">
+            <a:schemeClr val="accent1"/>
+          </a:fillRef>
+          <a:effectRef idx="0">
+            <a:schemeClr val="accent1"/>
+          </a:effectRef>
+          <a:fontRef idx="minor">
+            <a:schemeClr val="tx1"/>
+          </a:fontRef>
+        </p:style>
+      </p:cxnSp>
+      <p:cxnSp>
+        <p:nvCxnSpPr>
+          <p:cNvPr id="18" name="Straight Arrow Connector 17">
+            <a:extLst>
+              <a:ext uri="{FF2B5EF4-FFF2-40B4-BE49-F238E27FC236}">
+                <a16:creationId xmlns:a16="http://schemas.microsoft.com/office/drawing/2014/main" id="{B4592B34-B175-EC17-439B-933C119D68E1}"/>
+              </a:ext>
+            </a:extLst>
+          </p:cNvPr>
+          <p:cNvCxnSpPr>
+            <a:cxnSpLocks/>
+          </p:cNvCxnSpPr>
+          <p:nvPr/>
+        </p:nvCxnSpPr>
+        <p:spPr>
+          <a:xfrm flipV="1">
+            <a:off x="2827306" y="3342127"/>
+            <a:ext cx="0" cy="288461"/>
+          </a:xfrm>
+          <a:prstGeom prst="straightConnector1">
+            <a:avLst/>
+          </a:prstGeom>
+          <a:ln w="15875">
+            <a:solidFill>
+              <a:schemeClr val="tx1"/>
+            </a:solidFill>
+            <a:headEnd type="none" w="med" len="sm"/>
+            <a:tailEnd type="arrow" w="med" len="sm"/>
+          </a:ln>
+        </p:spPr>
+        <p:style>
+          <a:lnRef idx="1">
+            <a:schemeClr val="accent1"/>
+          </a:lnRef>
+          <a:fillRef idx="0">
+            <a:schemeClr val="accent1"/>
+          </a:fillRef>
+          <a:effectRef idx="0">
+            <a:schemeClr val="accent1"/>
+          </a:effectRef>
+          <a:fontRef idx="minor">
+            <a:schemeClr val="tx1"/>
+          </a:fontRef>
+        </p:style>
+      </p:cxnSp>
+    </p:spTree>
+    <p:extLst>
+      <p:ext uri="{BB962C8B-B14F-4D97-AF65-F5344CB8AC3E}">
         <p14:creationId xmlns:p14="http://schemas.microsoft.com/office/powerpoint/2010/main" val="2219326148"/>
       </p:ext>
     </p:extLst>

</xml_diff>